<commit_message>
readme added. removed a few console.logs from passport file
</commit_message>
<xml_diff>
--- a/misc_ref/ERD.pptx
+++ b/misc_ref/ERD.pptx
@@ -112,7 +112,7 @@
             <a:srgbClr val="A4A3A4"/>
           </p15:clr>
         </p15:guide>
-        <p15:guide id="2" pos="3840" userDrawn="1">
+        <p15:guide id="2" pos="3841" userDrawn="1">
           <p15:clr>
             <a:srgbClr val="A4A3A4"/>
           </p15:clr>
@@ -153,7 +153,7 @@
         <p:spPr>
           <a:xfrm>
             <a:off x="1524000" y="1122363"/>
-            <a:ext cx="9144000" cy="2387600"/>
+            <a:ext cx="9144001" cy="2387600"/>
           </a:xfrm>
         </p:spPr>
         <p:txBody>
@@ -185,7 +185,7 @@
         <p:spPr>
           <a:xfrm>
             <a:off x="1524000" y="3602038"/>
-            <a:ext cx="9144000" cy="1655762"/>
+            <a:ext cx="9144001" cy="1655762"/>
           </a:xfrm>
         </p:spPr>
         <p:txBody>
@@ -193,37 +193,37 @@
           <a:lstStyle>
             <a:lvl1pPr marL="0" indent="0" algn="ctr">
               <a:buNone/>
-              <a:defRPr sz="2400"/>
+              <a:defRPr sz="2401"/>
             </a:lvl1pPr>
-            <a:lvl2pPr marL="457200" indent="0" algn="ctr">
+            <a:lvl2pPr marL="457218" indent="0" algn="ctr">
               <a:buNone/>
               <a:defRPr sz="2000"/>
             </a:lvl2pPr>
-            <a:lvl3pPr marL="914400" indent="0" algn="ctr">
+            <a:lvl3pPr marL="914436" indent="0" algn="ctr">
               <a:buNone/>
               <a:defRPr sz="1800"/>
             </a:lvl3pPr>
-            <a:lvl4pPr marL="1371600" indent="0" algn="ctr">
+            <a:lvl4pPr marL="1371654" indent="0" algn="ctr">
               <a:buNone/>
               <a:defRPr sz="1600"/>
             </a:lvl4pPr>
-            <a:lvl5pPr marL="1828800" indent="0" algn="ctr">
+            <a:lvl5pPr marL="1828872" indent="0" algn="ctr">
               <a:buNone/>
               <a:defRPr sz="1600"/>
             </a:lvl5pPr>
-            <a:lvl6pPr marL="2286000" indent="0" algn="ctr">
+            <a:lvl6pPr marL="2286090" indent="0" algn="ctr">
               <a:buNone/>
               <a:defRPr sz="1600"/>
             </a:lvl6pPr>
-            <a:lvl7pPr marL="2743200" indent="0" algn="ctr">
+            <a:lvl7pPr marL="2743308" indent="0" algn="ctr">
               <a:buNone/>
               <a:defRPr sz="1600"/>
             </a:lvl7pPr>
-            <a:lvl8pPr marL="3200400" indent="0" algn="ctr">
+            <a:lvl8pPr marL="3200526" indent="0" algn="ctr">
               <a:buNone/>
               <a:defRPr sz="1600"/>
             </a:lvl8pPr>
-            <a:lvl9pPr marL="3657600" indent="0" algn="ctr">
+            <a:lvl9pPr marL="3657744" indent="0" algn="ctr">
               <a:buNone/>
               <a:defRPr sz="1600"/>
             </a:lvl9pPr>
@@ -254,7 +254,7 @@
           <a:p>
             <a:fld id="{B7C65DD6-99D7-C944-AB61-B1CFB81FCB1C}" type="datetimeFigureOut">
               <a:rPr lang="en-US" smtClean="0"/>
-              <a:t>7/28/17</a:t>
+              <a:t>8/1/17</a:t>
             </a:fld>
             <a:endParaRPr lang="en-US"/>
           </a:p>
@@ -424,7 +424,7 @@
           <a:p>
             <a:fld id="{B7C65DD6-99D7-C944-AB61-B1CFB81FCB1C}" type="datetimeFigureOut">
               <a:rPr lang="en-US" smtClean="0"/>
-              <a:t>7/28/17</a:t>
+              <a:t>8/1/17</a:t>
             </a:fld>
             <a:endParaRPr lang="en-US"/>
           </a:p>
@@ -514,8 +514,8 @@
         </p:nvSpPr>
         <p:spPr>
           <a:xfrm>
-            <a:off x="8724900" y="365125"/>
-            <a:ext cx="2628900" cy="5811838"/>
+            <a:off x="8724902" y="365125"/>
+            <a:ext cx="2628899" cy="5811838"/>
           </a:xfrm>
         </p:spPr>
         <p:txBody>
@@ -604,7 +604,7 @@
           <a:p>
             <a:fld id="{B7C65DD6-99D7-C944-AB61-B1CFB81FCB1C}" type="datetimeFigureOut">
               <a:rPr lang="en-US" smtClean="0"/>
-              <a:t>7/28/17</a:t>
+              <a:t>8/1/17</a:t>
             </a:fld>
             <a:endParaRPr lang="en-US"/>
           </a:p>
@@ -774,7 +774,7 @@
           <a:p>
             <a:fld id="{B7C65DD6-99D7-C944-AB61-B1CFB81FCB1C}" type="datetimeFigureOut">
               <a:rPr lang="en-US" smtClean="0"/>
-              <a:t>7/28/17</a:t>
+              <a:t>8/1/17</a:t>
             </a:fld>
             <a:endParaRPr lang="en-US"/>
           </a:p>
@@ -864,8 +864,8 @@
         </p:nvSpPr>
         <p:spPr>
           <a:xfrm>
-            <a:off x="831850" y="1709738"/>
-            <a:ext cx="10515600" cy="2852737"/>
+            <a:off x="831850" y="1709740"/>
+            <a:ext cx="10515601" cy="2852737"/>
           </a:xfrm>
         </p:spPr>
         <p:txBody>
@@ -896,8 +896,8 @@
         </p:nvSpPr>
         <p:spPr>
           <a:xfrm>
-            <a:off x="831850" y="4589463"/>
-            <a:ext cx="10515600" cy="1500187"/>
+            <a:off x="831850" y="4589465"/>
+            <a:ext cx="10515601" cy="1500187"/>
           </a:xfrm>
         </p:spPr>
         <p:txBody>
@@ -905,7 +905,7 @@
           <a:lstStyle>
             <a:lvl1pPr marL="0" indent="0">
               <a:buNone/>
-              <a:defRPr sz="2400">
+              <a:defRPr sz="2401">
                 <a:solidFill>
                   <a:schemeClr val="tx1">
                     <a:tint val="75000"/>
@@ -913,7 +913,7 @@
                 </a:solidFill>
               </a:defRPr>
             </a:lvl1pPr>
-            <a:lvl2pPr marL="457200" indent="0">
+            <a:lvl2pPr marL="457218" indent="0">
               <a:buNone/>
               <a:defRPr sz="2000">
                 <a:solidFill>
@@ -923,7 +923,7 @@
                 </a:solidFill>
               </a:defRPr>
             </a:lvl2pPr>
-            <a:lvl3pPr marL="914400" indent="0">
+            <a:lvl3pPr marL="914436" indent="0">
               <a:buNone/>
               <a:defRPr sz="1800">
                 <a:solidFill>
@@ -933,7 +933,7 @@
                 </a:solidFill>
               </a:defRPr>
             </a:lvl3pPr>
-            <a:lvl4pPr marL="1371600" indent="0">
+            <a:lvl4pPr marL="1371654" indent="0">
               <a:buNone/>
               <a:defRPr sz="1600">
                 <a:solidFill>
@@ -943,7 +943,7 @@
                 </a:solidFill>
               </a:defRPr>
             </a:lvl4pPr>
-            <a:lvl5pPr marL="1828800" indent="0">
+            <a:lvl5pPr marL="1828872" indent="0">
               <a:buNone/>
               <a:defRPr sz="1600">
                 <a:solidFill>
@@ -953,7 +953,7 @@
                 </a:solidFill>
               </a:defRPr>
             </a:lvl5pPr>
-            <a:lvl6pPr marL="2286000" indent="0">
+            <a:lvl6pPr marL="2286090" indent="0">
               <a:buNone/>
               <a:defRPr sz="1600">
                 <a:solidFill>
@@ -963,7 +963,7 @@
                 </a:solidFill>
               </a:defRPr>
             </a:lvl6pPr>
-            <a:lvl7pPr marL="2743200" indent="0">
+            <a:lvl7pPr marL="2743308" indent="0">
               <a:buNone/>
               <a:defRPr sz="1600">
                 <a:solidFill>
@@ -973,7 +973,7 @@
                 </a:solidFill>
               </a:defRPr>
             </a:lvl7pPr>
-            <a:lvl8pPr marL="3200400" indent="0">
+            <a:lvl8pPr marL="3200526" indent="0">
               <a:buNone/>
               <a:defRPr sz="1600">
                 <a:solidFill>
@@ -983,7 +983,7 @@
                 </a:solidFill>
               </a:defRPr>
             </a:lvl8pPr>
-            <a:lvl9pPr marL="3657600" indent="0">
+            <a:lvl9pPr marL="3657744" indent="0">
               <a:buNone/>
               <a:defRPr sz="1600">
                 <a:solidFill>
@@ -1020,7 +1020,7 @@
           <a:p>
             <a:fld id="{B7C65DD6-99D7-C944-AB61-B1CFB81FCB1C}" type="datetimeFigureOut">
               <a:rPr lang="en-US" smtClean="0"/>
-              <a:t>7/28/17</a:t>
+              <a:t>8/1/17</a:t>
             </a:fld>
             <a:endParaRPr lang="en-US"/>
           </a:p>
@@ -1252,7 +1252,7 @@
           <a:p>
             <a:fld id="{B7C65DD6-99D7-C944-AB61-B1CFB81FCB1C}" type="datetimeFigureOut">
               <a:rPr lang="en-US" smtClean="0"/>
-              <a:t>7/28/17</a:t>
+              <a:t>8/1/17</a:t>
             </a:fld>
             <a:endParaRPr lang="en-US"/>
           </a:p>
@@ -1342,8 +1342,8 @@
         </p:nvSpPr>
         <p:spPr>
           <a:xfrm>
-            <a:off x="839788" y="365125"/>
-            <a:ext cx="10515600" cy="1325563"/>
+            <a:off x="839787" y="365127"/>
+            <a:ext cx="10515601" cy="1325563"/>
           </a:xfrm>
         </p:spPr>
         <p:txBody>
@@ -1370,7 +1370,7 @@
         </p:nvSpPr>
         <p:spPr>
           <a:xfrm>
-            <a:off x="839788" y="1681163"/>
+            <a:off x="839789" y="1681163"/>
             <a:ext cx="5157787" cy="823912"/>
           </a:xfrm>
         </p:spPr>
@@ -1379,37 +1379,37 @@
           <a:lstStyle>
             <a:lvl1pPr marL="0" indent="0">
               <a:buNone/>
-              <a:defRPr sz="2400" b="1"/>
+              <a:defRPr sz="2401" b="1"/>
             </a:lvl1pPr>
-            <a:lvl2pPr marL="457200" indent="0">
+            <a:lvl2pPr marL="457218" indent="0">
               <a:buNone/>
               <a:defRPr sz="2000" b="1"/>
             </a:lvl2pPr>
-            <a:lvl3pPr marL="914400" indent="0">
+            <a:lvl3pPr marL="914436" indent="0">
               <a:buNone/>
               <a:defRPr sz="1800" b="1"/>
             </a:lvl3pPr>
-            <a:lvl4pPr marL="1371600" indent="0">
+            <a:lvl4pPr marL="1371654" indent="0">
               <a:buNone/>
               <a:defRPr sz="1600" b="1"/>
             </a:lvl4pPr>
-            <a:lvl5pPr marL="1828800" indent="0">
+            <a:lvl5pPr marL="1828872" indent="0">
               <a:buNone/>
               <a:defRPr sz="1600" b="1"/>
             </a:lvl5pPr>
-            <a:lvl6pPr marL="2286000" indent="0">
+            <a:lvl6pPr marL="2286090" indent="0">
               <a:buNone/>
               <a:defRPr sz="1600" b="1"/>
             </a:lvl6pPr>
-            <a:lvl7pPr marL="2743200" indent="0">
+            <a:lvl7pPr marL="2743308" indent="0">
               <a:buNone/>
               <a:defRPr sz="1600" b="1"/>
             </a:lvl7pPr>
-            <a:lvl8pPr marL="3200400" indent="0">
+            <a:lvl8pPr marL="3200526" indent="0">
               <a:buNone/>
               <a:defRPr sz="1600" b="1"/>
             </a:lvl8pPr>
-            <a:lvl9pPr marL="3657600" indent="0">
+            <a:lvl9pPr marL="3657744" indent="0">
               <a:buNone/>
               <a:defRPr sz="1600" b="1"/>
             </a:lvl9pPr>
@@ -1435,7 +1435,7 @@
         </p:nvSpPr>
         <p:spPr>
           <a:xfrm>
-            <a:off x="839788" y="2505075"/>
+            <a:off x="839789" y="2505075"/>
             <a:ext cx="5157787" cy="3684588"/>
           </a:xfrm>
         </p:spPr>
@@ -1501,37 +1501,37 @@
           <a:lstStyle>
             <a:lvl1pPr marL="0" indent="0">
               <a:buNone/>
-              <a:defRPr sz="2400" b="1"/>
+              <a:defRPr sz="2401" b="1"/>
             </a:lvl1pPr>
-            <a:lvl2pPr marL="457200" indent="0">
+            <a:lvl2pPr marL="457218" indent="0">
               <a:buNone/>
               <a:defRPr sz="2000" b="1"/>
             </a:lvl2pPr>
-            <a:lvl3pPr marL="914400" indent="0">
+            <a:lvl3pPr marL="914436" indent="0">
               <a:buNone/>
               <a:defRPr sz="1800" b="1"/>
             </a:lvl3pPr>
-            <a:lvl4pPr marL="1371600" indent="0">
+            <a:lvl4pPr marL="1371654" indent="0">
               <a:buNone/>
               <a:defRPr sz="1600" b="1"/>
             </a:lvl4pPr>
-            <a:lvl5pPr marL="1828800" indent="0">
+            <a:lvl5pPr marL="1828872" indent="0">
               <a:buNone/>
               <a:defRPr sz="1600" b="1"/>
             </a:lvl5pPr>
-            <a:lvl6pPr marL="2286000" indent="0">
+            <a:lvl6pPr marL="2286090" indent="0">
               <a:buNone/>
               <a:defRPr sz="1600" b="1"/>
             </a:lvl6pPr>
-            <a:lvl7pPr marL="2743200" indent="0">
+            <a:lvl7pPr marL="2743308" indent="0">
               <a:buNone/>
               <a:defRPr sz="1600" b="1"/>
             </a:lvl7pPr>
-            <a:lvl8pPr marL="3200400" indent="0">
+            <a:lvl8pPr marL="3200526" indent="0">
               <a:buNone/>
               <a:defRPr sz="1600" b="1"/>
             </a:lvl8pPr>
-            <a:lvl9pPr marL="3657600" indent="0">
+            <a:lvl9pPr marL="3657744" indent="0">
               <a:buNone/>
               <a:defRPr sz="1600" b="1"/>
             </a:lvl9pPr>
@@ -1619,7 +1619,7 @@
           <a:p>
             <a:fld id="{B7C65DD6-99D7-C944-AB61-B1CFB81FCB1C}" type="datetimeFigureOut">
               <a:rPr lang="en-US" smtClean="0"/>
-              <a:t>7/28/17</a:t>
+              <a:t>8/1/17</a:t>
             </a:fld>
             <a:endParaRPr lang="en-US"/>
           </a:p>
@@ -1737,7 +1737,7 @@
           <a:p>
             <a:fld id="{B7C65DD6-99D7-C944-AB61-B1CFB81FCB1C}" type="datetimeFigureOut">
               <a:rPr lang="en-US" smtClean="0"/>
-              <a:t>7/28/17</a:t>
+              <a:t>8/1/17</a:t>
             </a:fld>
             <a:endParaRPr lang="en-US"/>
           </a:p>
@@ -1832,7 +1832,7 @@
           <a:p>
             <a:fld id="{B7C65DD6-99D7-C944-AB61-B1CFB81FCB1C}" type="datetimeFigureOut">
               <a:rPr lang="en-US" smtClean="0"/>
-              <a:t>7/28/17</a:t>
+              <a:t>8/1/17</a:t>
             </a:fld>
             <a:endParaRPr lang="en-US"/>
           </a:p>
@@ -1922,7 +1922,7 @@
         </p:nvSpPr>
         <p:spPr>
           <a:xfrm>
-            <a:off x="839788" y="457200"/>
+            <a:off x="839789" y="457200"/>
             <a:ext cx="3932237" cy="1600200"/>
           </a:xfrm>
         </p:spPr>
@@ -1954,7 +1954,7 @@
         </p:nvSpPr>
         <p:spPr>
           <a:xfrm>
-            <a:off x="5183188" y="987425"/>
+            <a:off x="5183188" y="987427"/>
             <a:ext cx="6172200" cy="4873625"/>
           </a:xfrm>
         </p:spPr>
@@ -1968,7 +1968,7 @@
               <a:defRPr sz="2800"/>
             </a:lvl2pPr>
             <a:lvl3pPr>
-              <a:defRPr sz="2400"/>
+              <a:defRPr sz="2401"/>
             </a:lvl3pPr>
             <a:lvl4pPr>
               <a:defRPr sz="2000"/>
@@ -2039,7 +2039,7 @@
         </p:nvSpPr>
         <p:spPr>
           <a:xfrm>
-            <a:off x="839788" y="2057400"/>
+            <a:off x="839789" y="2057400"/>
             <a:ext cx="3932237" cy="3811588"/>
           </a:xfrm>
         </p:spPr>
@@ -2050,35 +2050,35 @@
               <a:buNone/>
               <a:defRPr sz="1600"/>
             </a:lvl1pPr>
-            <a:lvl2pPr marL="457200" indent="0">
+            <a:lvl2pPr marL="457218" indent="0">
               <a:buNone/>
-              <a:defRPr sz="1400"/>
+              <a:defRPr sz="1399"/>
             </a:lvl2pPr>
-            <a:lvl3pPr marL="914400" indent="0">
+            <a:lvl3pPr marL="914436" indent="0">
               <a:buNone/>
               <a:defRPr sz="1200"/>
             </a:lvl3pPr>
-            <a:lvl4pPr marL="1371600" indent="0">
+            <a:lvl4pPr marL="1371654" indent="0">
               <a:buNone/>
               <a:defRPr sz="1000"/>
             </a:lvl4pPr>
-            <a:lvl5pPr marL="1828800" indent="0">
+            <a:lvl5pPr marL="1828872" indent="0">
               <a:buNone/>
               <a:defRPr sz="1000"/>
             </a:lvl5pPr>
-            <a:lvl6pPr marL="2286000" indent="0">
+            <a:lvl6pPr marL="2286090" indent="0">
               <a:buNone/>
               <a:defRPr sz="1000"/>
             </a:lvl6pPr>
-            <a:lvl7pPr marL="2743200" indent="0">
+            <a:lvl7pPr marL="2743308" indent="0">
               <a:buNone/>
               <a:defRPr sz="1000"/>
             </a:lvl7pPr>
-            <a:lvl8pPr marL="3200400" indent="0">
+            <a:lvl8pPr marL="3200526" indent="0">
               <a:buNone/>
               <a:defRPr sz="1000"/>
             </a:lvl8pPr>
-            <a:lvl9pPr marL="3657600" indent="0">
+            <a:lvl9pPr marL="3657744" indent="0">
               <a:buNone/>
               <a:defRPr sz="1000"/>
             </a:lvl9pPr>
@@ -2109,7 +2109,7 @@
           <a:p>
             <a:fld id="{B7C65DD6-99D7-C944-AB61-B1CFB81FCB1C}" type="datetimeFigureOut">
               <a:rPr lang="en-US" smtClean="0"/>
-              <a:t>7/28/17</a:t>
+              <a:t>8/1/17</a:t>
             </a:fld>
             <a:endParaRPr lang="en-US"/>
           </a:p>
@@ -2199,7 +2199,7 @@
         </p:nvSpPr>
         <p:spPr>
           <a:xfrm>
-            <a:off x="839788" y="457200"/>
+            <a:off x="839789" y="457200"/>
             <a:ext cx="3932237" cy="1600200"/>
           </a:xfrm>
         </p:spPr>
@@ -2231,7 +2231,7 @@
         </p:nvSpPr>
         <p:spPr>
           <a:xfrm>
-            <a:off x="5183188" y="987425"/>
+            <a:off x="5183188" y="987427"/>
             <a:ext cx="6172200" cy="4873625"/>
           </a:xfrm>
         </p:spPr>
@@ -2242,35 +2242,35 @@
               <a:buNone/>
               <a:defRPr sz="3200"/>
             </a:lvl1pPr>
-            <a:lvl2pPr marL="457200" indent="0">
+            <a:lvl2pPr marL="457218" indent="0">
               <a:buNone/>
               <a:defRPr sz="2800"/>
             </a:lvl2pPr>
-            <a:lvl3pPr marL="914400" indent="0">
+            <a:lvl3pPr marL="914436" indent="0">
               <a:buNone/>
-              <a:defRPr sz="2400"/>
+              <a:defRPr sz="2401"/>
             </a:lvl3pPr>
-            <a:lvl4pPr marL="1371600" indent="0">
+            <a:lvl4pPr marL="1371654" indent="0">
               <a:buNone/>
               <a:defRPr sz="2000"/>
             </a:lvl4pPr>
-            <a:lvl5pPr marL="1828800" indent="0">
+            <a:lvl5pPr marL="1828872" indent="0">
               <a:buNone/>
               <a:defRPr sz="2000"/>
             </a:lvl5pPr>
-            <a:lvl6pPr marL="2286000" indent="0">
+            <a:lvl6pPr marL="2286090" indent="0">
               <a:buNone/>
               <a:defRPr sz="2000"/>
             </a:lvl6pPr>
-            <a:lvl7pPr marL="2743200" indent="0">
+            <a:lvl7pPr marL="2743308" indent="0">
               <a:buNone/>
               <a:defRPr sz="2000"/>
             </a:lvl7pPr>
-            <a:lvl8pPr marL="3200400" indent="0">
+            <a:lvl8pPr marL="3200526" indent="0">
               <a:buNone/>
               <a:defRPr sz="2000"/>
             </a:lvl8pPr>
-            <a:lvl9pPr marL="3657600" indent="0">
+            <a:lvl9pPr marL="3657744" indent="0">
               <a:buNone/>
               <a:defRPr sz="2000"/>
             </a:lvl9pPr>
@@ -2292,7 +2292,7 @@
         </p:nvSpPr>
         <p:spPr>
           <a:xfrm>
-            <a:off x="839788" y="2057400"/>
+            <a:off x="839789" y="2057400"/>
             <a:ext cx="3932237" cy="3811588"/>
           </a:xfrm>
         </p:spPr>
@@ -2303,35 +2303,35 @@
               <a:buNone/>
               <a:defRPr sz="1600"/>
             </a:lvl1pPr>
-            <a:lvl2pPr marL="457200" indent="0">
+            <a:lvl2pPr marL="457218" indent="0">
               <a:buNone/>
-              <a:defRPr sz="1400"/>
+              <a:defRPr sz="1399"/>
             </a:lvl2pPr>
-            <a:lvl3pPr marL="914400" indent="0">
+            <a:lvl3pPr marL="914436" indent="0">
               <a:buNone/>
               <a:defRPr sz="1200"/>
             </a:lvl3pPr>
-            <a:lvl4pPr marL="1371600" indent="0">
+            <a:lvl4pPr marL="1371654" indent="0">
               <a:buNone/>
               <a:defRPr sz="1000"/>
             </a:lvl4pPr>
-            <a:lvl5pPr marL="1828800" indent="0">
+            <a:lvl5pPr marL="1828872" indent="0">
               <a:buNone/>
               <a:defRPr sz="1000"/>
             </a:lvl5pPr>
-            <a:lvl6pPr marL="2286000" indent="0">
+            <a:lvl6pPr marL="2286090" indent="0">
               <a:buNone/>
               <a:defRPr sz="1000"/>
             </a:lvl6pPr>
-            <a:lvl7pPr marL="2743200" indent="0">
+            <a:lvl7pPr marL="2743308" indent="0">
               <a:buNone/>
               <a:defRPr sz="1000"/>
             </a:lvl7pPr>
-            <a:lvl8pPr marL="3200400" indent="0">
+            <a:lvl8pPr marL="3200526" indent="0">
               <a:buNone/>
               <a:defRPr sz="1000"/>
             </a:lvl8pPr>
-            <a:lvl9pPr marL="3657600" indent="0">
+            <a:lvl9pPr marL="3657744" indent="0">
               <a:buNone/>
               <a:defRPr sz="1000"/>
             </a:lvl9pPr>
@@ -2362,7 +2362,7 @@
           <a:p>
             <a:fld id="{B7C65DD6-99D7-C944-AB61-B1CFB81FCB1C}" type="datetimeFigureOut">
               <a:rPr lang="en-US" smtClean="0"/>
-              <a:t>7/28/17</a:t>
+              <a:t>8/1/17</a:t>
             </a:fld>
             <a:endParaRPr lang="en-US"/>
           </a:p>
@@ -2457,8 +2457,8 @@
         </p:nvSpPr>
         <p:spPr>
           <a:xfrm>
-            <a:off x="838200" y="365125"/>
-            <a:ext cx="10515600" cy="1325563"/>
+            <a:off x="838200" y="365127"/>
+            <a:ext cx="10515601" cy="1325563"/>
           </a:xfrm>
           <a:prstGeom prst="rect">
             <a:avLst/>
@@ -2491,7 +2491,7 @@
         <p:spPr>
           <a:xfrm>
             <a:off x="838200" y="1825625"/>
-            <a:ext cx="10515600" cy="4351338"/>
+            <a:ext cx="10515601" cy="4351338"/>
           </a:xfrm>
           <a:prstGeom prst="rect">
             <a:avLst/>
@@ -2552,7 +2552,7 @@
         </p:nvSpPr>
         <p:spPr>
           <a:xfrm>
-            <a:off x="838200" y="6356350"/>
+            <a:off x="838200" y="6356352"/>
             <a:ext cx="2743200" cy="365125"/>
           </a:xfrm>
           <a:prstGeom prst="rect">
@@ -2575,7 +2575,7 @@
           <a:p>
             <a:fld id="{B7C65DD6-99D7-C944-AB61-B1CFB81FCB1C}" type="datetimeFigureOut">
               <a:rPr lang="en-US" smtClean="0"/>
-              <a:t>7/28/17</a:t>
+              <a:t>8/1/17</a:t>
             </a:fld>
             <a:endParaRPr lang="en-US"/>
           </a:p>
@@ -2593,7 +2593,7 @@
         </p:nvSpPr>
         <p:spPr>
           <a:xfrm>
-            <a:off x="4038600" y="6356350"/>
+            <a:off x="4038600" y="6356352"/>
             <a:ext cx="4114800" cy="365125"/>
           </a:xfrm>
           <a:prstGeom prst="rect">
@@ -2630,7 +2630,7 @@
         </p:nvSpPr>
         <p:spPr>
           <a:xfrm>
-            <a:off x="8610600" y="6356350"/>
+            <a:off x="8610600" y="6356352"/>
             <a:ext cx="2743200" cy="365125"/>
           </a:xfrm>
           <a:prstGeom prst="rect">
@@ -2682,7 +2682,7 @@
   </p:sldLayoutIdLst>
   <p:txStyles>
     <p:titleStyle>
-      <a:lvl1pPr algn="l" defTabSz="914400" rtl="0" eaLnBrk="1" latinLnBrk="0" hangingPunct="1">
+      <a:lvl1pPr algn="l" defTabSz="914436" rtl="0" eaLnBrk="1" latinLnBrk="0" hangingPunct="1">
         <a:lnSpc>
           <a:spcPct val="90000"/>
         </a:lnSpc>
@@ -2701,7 +2701,7 @@
       </a:lvl1pPr>
     </p:titleStyle>
     <p:bodyStyle>
-      <a:lvl1pPr marL="228600" indent="-228600" algn="l" defTabSz="914400" rtl="0" eaLnBrk="1" latinLnBrk="0" hangingPunct="1">
+      <a:lvl1pPr marL="228610" indent="-228610" algn="l" defTabSz="914436" rtl="0" eaLnBrk="1" latinLnBrk="0" hangingPunct="1">
         <a:lnSpc>
           <a:spcPct val="90000"/>
         </a:lnSpc>
@@ -2719,7 +2719,7 @@
           <a:cs typeface="+mn-cs"/>
         </a:defRPr>
       </a:lvl1pPr>
-      <a:lvl2pPr marL="685800" indent="-228600" algn="l" defTabSz="914400" rtl="0" eaLnBrk="1" latinLnBrk="0" hangingPunct="1">
+      <a:lvl2pPr marL="685828" indent="-228610" algn="l" defTabSz="914436" rtl="0" eaLnBrk="1" latinLnBrk="0" hangingPunct="1">
         <a:lnSpc>
           <a:spcPct val="90000"/>
         </a:lnSpc>
@@ -2728,7 +2728,7 @@
         </a:spcBef>
         <a:buFont typeface="Arial"/>
         <a:buChar char="•"/>
-        <a:defRPr sz="2400" kern="1200">
+        <a:defRPr sz="2401" kern="1200">
           <a:solidFill>
             <a:schemeClr val="tx1"/>
           </a:solidFill>
@@ -2737,7 +2737,7 @@
           <a:cs typeface="+mn-cs"/>
         </a:defRPr>
       </a:lvl2pPr>
-      <a:lvl3pPr marL="1143000" indent="-228600" algn="l" defTabSz="914400" rtl="0" eaLnBrk="1" latinLnBrk="0" hangingPunct="1">
+      <a:lvl3pPr marL="1143046" indent="-228610" algn="l" defTabSz="914436" rtl="0" eaLnBrk="1" latinLnBrk="0" hangingPunct="1">
         <a:lnSpc>
           <a:spcPct val="90000"/>
         </a:lnSpc>
@@ -2755,7 +2755,7 @@
           <a:cs typeface="+mn-cs"/>
         </a:defRPr>
       </a:lvl3pPr>
-      <a:lvl4pPr marL="1600200" indent="-228600" algn="l" defTabSz="914400" rtl="0" eaLnBrk="1" latinLnBrk="0" hangingPunct="1">
+      <a:lvl4pPr marL="1600264" indent="-228610" algn="l" defTabSz="914436" rtl="0" eaLnBrk="1" latinLnBrk="0" hangingPunct="1">
         <a:lnSpc>
           <a:spcPct val="90000"/>
         </a:lnSpc>
@@ -2773,7 +2773,7 @@
           <a:cs typeface="+mn-cs"/>
         </a:defRPr>
       </a:lvl4pPr>
-      <a:lvl5pPr marL="2057400" indent="-228600" algn="l" defTabSz="914400" rtl="0" eaLnBrk="1" latinLnBrk="0" hangingPunct="1">
+      <a:lvl5pPr marL="2057482" indent="-228610" algn="l" defTabSz="914436" rtl="0" eaLnBrk="1" latinLnBrk="0" hangingPunct="1">
         <a:lnSpc>
           <a:spcPct val="90000"/>
         </a:lnSpc>
@@ -2791,7 +2791,7 @@
           <a:cs typeface="+mn-cs"/>
         </a:defRPr>
       </a:lvl5pPr>
-      <a:lvl6pPr marL="2514600" indent="-228600" algn="l" defTabSz="914400" rtl="0" eaLnBrk="1" latinLnBrk="0" hangingPunct="1">
+      <a:lvl6pPr marL="2514700" indent="-228610" algn="l" defTabSz="914436" rtl="0" eaLnBrk="1" latinLnBrk="0" hangingPunct="1">
         <a:lnSpc>
           <a:spcPct val="90000"/>
         </a:lnSpc>
@@ -2809,7 +2809,7 @@
           <a:cs typeface="+mn-cs"/>
         </a:defRPr>
       </a:lvl6pPr>
-      <a:lvl7pPr marL="2971800" indent="-228600" algn="l" defTabSz="914400" rtl="0" eaLnBrk="1" latinLnBrk="0" hangingPunct="1">
+      <a:lvl7pPr marL="2971918" indent="-228610" algn="l" defTabSz="914436" rtl="0" eaLnBrk="1" latinLnBrk="0" hangingPunct="1">
         <a:lnSpc>
           <a:spcPct val="90000"/>
         </a:lnSpc>
@@ -2827,7 +2827,7 @@
           <a:cs typeface="+mn-cs"/>
         </a:defRPr>
       </a:lvl7pPr>
-      <a:lvl8pPr marL="3429000" indent="-228600" algn="l" defTabSz="914400" rtl="0" eaLnBrk="1" latinLnBrk="0" hangingPunct="1">
+      <a:lvl8pPr marL="3429136" indent="-228610" algn="l" defTabSz="914436" rtl="0" eaLnBrk="1" latinLnBrk="0" hangingPunct="1">
         <a:lnSpc>
           <a:spcPct val="90000"/>
         </a:lnSpc>
@@ -2845,7 +2845,7 @@
           <a:cs typeface="+mn-cs"/>
         </a:defRPr>
       </a:lvl8pPr>
-      <a:lvl9pPr marL="3886200" indent="-228600" algn="l" defTabSz="914400" rtl="0" eaLnBrk="1" latinLnBrk="0" hangingPunct="1">
+      <a:lvl9pPr marL="3886354" indent="-228610" algn="l" defTabSz="914436" rtl="0" eaLnBrk="1" latinLnBrk="0" hangingPunct="1">
         <a:lnSpc>
           <a:spcPct val="90000"/>
         </a:lnSpc>
@@ -2868,7 +2868,7 @@
       <a:defPPr>
         <a:defRPr lang="en-US"/>
       </a:defPPr>
-      <a:lvl1pPr marL="0" algn="l" defTabSz="914400" rtl="0" eaLnBrk="1" latinLnBrk="0" hangingPunct="1">
+      <a:lvl1pPr marL="0" algn="l" defTabSz="914436" rtl="0" eaLnBrk="1" latinLnBrk="0" hangingPunct="1">
         <a:defRPr sz="1800" kern="1200">
           <a:solidFill>
             <a:schemeClr val="tx1"/>
@@ -2878,7 +2878,7 @@
           <a:cs typeface="+mn-cs"/>
         </a:defRPr>
       </a:lvl1pPr>
-      <a:lvl2pPr marL="457200" algn="l" defTabSz="914400" rtl="0" eaLnBrk="1" latinLnBrk="0" hangingPunct="1">
+      <a:lvl2pPr marL="457218" algn="l" defTabSz="914436" rtl="0" eaLnBrk="1" latinLnBrk="0" hangingPunct="1">
         <a:defRPr sz="1800" kern="1200">
           <a:solidFill>
             <a:schemeClr val="tx1"/>
@@ -2888,7 +2888,7 @@
           <a:cs typeface="+mn-cs"/>
         </a:defRPr>
       </a:lvl2pPr>
-      <a:lvl3pPr marL="914400" algn="l" defTabSz="914400" rtl="0" eaLnBrk="1" latinLnBrk="0" hangingPunct="1">
+      <a:lvl3pPr marL="914436" algn="l" defTabSz="914436" rtl="0" eaLnBrk="1" latinLnBrk="0" hangingPunct="1">
         <a:defRPr sz="1800" kern="1200">
           <a:solidFill>
             <a:schemeClr val="tx1"/>
@@ -2898,7 +2898,7 @@
           <a:cs typeface="+mn-cs"/>
         </a:defRPr>
       </a:lvl3pPr>
-      <a:lvl4pPr marL="1371600" algn="l" defTabSz="914400" rtl="0" eaLnBrk="1" latinLnBrk="0" hangingPunct="1">
+      <a:lvl4pPr marL="1371654" algn="l" defTabSz="914436" rtl="0" eaLnBrk="1" latinLnBrk="0" hangingPunct="1">
         <a:defRPr sz="1800" kern="1200">
           <a:solidFill>
             <a:schemeClr val="tx1"/>
@@ -2908,7 +2908,7 @@
           <a:cs typeface="+mn-cs"/>
         </a:defRPr>
       </a:lvl4pPr>
-      <a:lvl5pPr marL="1828800" algn="l" defTabSz="914400" rtl="0" eaLnBrk="1" latinLnBrk="0" hangingPunct="1">
+      <a:lvl5pPr marL="1828872" algn="l" defTabSz="914436" rtl="0" eaLnBrk="1" latinLnBrk="0" hangingPunct="1">
         <a:defRPr sz="1800" kern="1200">
           <a:solidFill>
             <a:schemeClr val="tx1"/>
@@ -2918,7 +2918,7 @@
           <a:cs typeface="+mn-cs"/>
         </a:defRPr>
       </a:lvl5pPr>
-      <a:lvl6pPr marL="2286000" algn="l" defTabSz="914400" rtl="0" eaLnBrk="1" latinLnBrk="0" hangingPunct="1">
+      <a:lvl6pPr marL="2286090" algn="l" defTabSz="914436" rtl="0" eaLnBrk="1" latinLnBrk="0" hangingPunct="1">
         <a:defRPr sz="1800" kern="1200">
           <a:solidFill>
             <a:schemeClr val="tx1"/>
@@ -2928,7 +2928,7 @@
           <a:cs typeface="+mn-cs"/>
         </a:defRPr>
       </a:lvl6pPr>
-      <a:lvl7pPr marL="2743200" algn="l" defTabSz="914400" rtl="0" eaLnBrk="1" latinLnBrk="0" hangingPunct="1">
+      <a:lvl7pPr marL="2743308" algn="l" defTabSz="914436" rtl="0" eaLnBrk="1" latinLnBrk="0" hangingPunct="1">
         <a:defRPr sz="1800" kern="1200">
           <a:solidFill>
             <a:schemeClr val="tx1"/>
@@ -2938,7 +2938,7 @@
           <a:cs typeface="+mn-cs"/>
         </a:defRPr>
       </a:lvl7pPr>
-      <a:lvl8pPr marL="3200400" algn="l" defTabSz="914400" rtl="0" eaLnBrk="1" latinLnBrk="0" hangingPunct="1">
+      <a:lvl8pPr marL="3200526" algn="l" defTabSz="914436" rtl="0" eaLnBrk="1" latinLnBrk="0" hangingPunct="1">
         <a:defRPr sz="1800" kern="1200">
           <a:solidFill>
             <a:schemeClr val="tx1"/>
@@ -2948,7 +2948,7 @@
           <a:cs typeface="+mn-cs"/>
         </a:defRPr>
       </a:lvl8pPr>
-      <a:lvl9pPr marL="3657600" algn="l" defTabSz="914400" rtl="0" eaLnBrk="1" latinLnBrk="0" hangingPunct="1">
+      <a:lvl9pPr marL="3657744" algn="l" defTabSz="914436" rtl="0" eaLnBrk="1" latinLnBrk="0" hangingPunct="1">
         <a:defRPr sz="1800" kern="1200">
           <a:solidFill>
             <a:schemeClr val="tx1"/>
@@ -2989,14 +2989,14 @@
           <p:nvPr>
             <p:extLst>
               <p:ext uri="{D42A27DB-BD31-4B8C-83A1-F6EECF244321}">
-                <p14:modId xmlns:p14="http://schemas.microsoft.com/office/powerpoint/2010/main" val="1486198586"/>
+                <p14:modId xmlns:p14="http://schemas.microsoft.com/office/powerpoint/2010/main" val="828480304"/>
               </p:ext>
             </p:extLst>
           </p:nvPr>
         </p:nvGraphicFramePr>
         <p:xfrm>
-          <a:off x="1151466" y="778704"/>
-          <a:ext cx="3677012" cy="2370400"/>
+          <a:off x="1151466" y="1202450"/>
+          <a:ext cx="3677012" cy="2393882"/>
         </p:xfrm>
         <a:graphic>
           <a:graphicData uri="http://schemas.openxmlformats.org/drawingml/2006/table">
@@ -3008,7 +3008,7 @@
                 <a:gridCol w="1574185"/>
                 <a:gridCol w="2102827"/>
               </a:tblGrid>
-              <a:tr h="358720">
+              <a:tr h="358721">
                 <a:tc gridSpan="2">
                   <a:txBody>
                     <a:bodyPr/>
@@ -3022,7 +3022,7 @@
                       <a:endParaRPr lang="en-US" sz="1200" dirty="0"/>
                     </a:p>
                   </a:txBody>
-                  <a:tcPr anchor="ctr">
+                  <a:tcPr marL="91441" marR="91441" anchor="ctr">
                     <a:lnL w="12700" cap="flat" cmpd="sng" algn="ctr">
                       <a:solidFill>
                         <a:schemeClr val="tx1">
@@ -3060,7 +3060,7 @@
                   <a:tcPr/>
                 </a:tc>
               </a:tr>
-              <a:tr h="267291">
+              <a:tr h="277255">
                 <a:tc>
                   <a:txBody>
                     <a:bodyPr/>
@@ -3087,7 +3087,7 @@
                       </a:endParaRPr>
                     </a:p>
                   </a:txBody>
-                  <a:tcPr anchor="ctr">
+                  <a:tcPr marL="91441" marR="91441" anchor="ctr">
                     <a:lnL w="12700" cap="flat" cmpd="sng" algn="ctr">
                       <a:solidFill>
                         <a:schemeClr val="tx1">
@@ -3152,7 +3152,7 @@
                       </a:endParaRPr>
                     </a:p>
                   </a:txBody>
-                  <a:tcPr anchor="ctr">
+                  <a:tcPr marL="91441" marR="91441" anchor="ctr">
                     <a:lnR w="12700" cap="flat" cmpd="sng" algn="ctr">
                       <a:solidFill>
                         <a:schemeClr val="tx1">
@@ -3181,7 +3181,7 @@
                   </a:tcPr>
                 </a:tc>
               </a:tr>
-              <a:tr h="267291">
+              <a:tr h="277255">
                 <a:tc>
                   <a:txBody>
                     <a:bodyPr/>
@@ -3208,7 +3208,7 @@
                       </a:endParaRPr>
                     </a:p>
                   </a:txBody>
-                  <a:tcPr anchor="ctr">
+                  <a:tcPr marL="91441" marR="91441" anchor="ctr">
                     <a:lnL w="12700" cap="flat" cmpd="sng" algn="ctr">
                       <a:solidFill>
                         <a:schemeClr val="tx1">
@@ -3274,7 +3274,7 @@
                       </a:endParaRPr>
                     </a:p>
                   </a:txBody>
-                  <a:tcPr anchor="ctr">
+                  <a:tcPr marL="91441" marR="91441" anchor="ctr">
                     <a:lnR w="12700" cap="flat" cmpd="sng" algn="ctr">
                       <a:solidFill>
                         <a:schemeClr val="tx1">
@@ -3315,7 +3315,7 @@
                   </a:tcPr>
                 </a:tc>
               </a:tr>
-              <a:tr h="267291">
+              <a:tr h="277255">
                 <a:tc>
                   <a:txBody>
                     <a:bodyPr/>
@@ -3342,7 +3342,7 @@
                       </a:endParaRPr>
                     </a:p>
                   </a:txBody>
-                  <a:tcPr anchor="ctr">
+                  <a:tcPr marL="91441" marR="91441" anchor="ctr">
                     <a:lnL w="12700" cap="flat" cmpd="sng" algn="ctr">
                       <a:solidFill>
                         <a:schemeClr val="tx1">
@@ -3408,7 +3408,7 @@
                       </a:endParaRPr>
                     </a:p>
                   </a:txBody>
-                  <a:tcPr anchor="ctr">
+                  <a:tcPr marL="91441" marR="91441" anchor="ctr">
                     <a:lnR w="12700" cap="flat" cmpd="sng" algn="ctr">
                       <a:solidFill>
                         <a:schemeClr val="tx1">
@@ -3449,7 +3449,7 @@
                   </a:tcPr>
                 </a:tc>
               </a:tr>
-              <a:tr h="510654">
+              <a:tr h="648886">
                 <a:tc>
                   <a:txBody>
                     <a:bodyPr/>
@@ -3479,7 +3479,7 @@
                       </a:r>
                     </a:p>
                   </a:txBody>
-                  <a:tcPr anchor="ctr">
+                  <a:tcPr marL="91441" marR="91441" anchor="ctr">
                     <a:lnL w="12700" cap="flat" cmpd="sng" algn="ctr">
                       <a:solidFill>
                         <a:schemeClr val="tx1">
@@ -3582,7 +3582,7 @@
                       </a:endParaRPr>
                     </a:p>
                   </a:txBody>
-                  <a:tcPr anchor="ctr">
+                  <a:tcPr marL="91441" marR="91441" anchor="ctr">
                     <a:lnR w="12700" cap="flat" cmpd="sng" algn="ctr">
                       <a:solidFill>
                         <a:schemeClr val="tx1">
@@ -3623,7 +3623,7 @@
                   </a:tcPr>
                 </a:tc>
               </a:tr>
-              <a:tr h="267291">
+              <a:tr h="277255">
                 <a:tc>
                   <a:txBody>
                     <a:bodyPr/>
@@ -3661,7 +3661,7 @@
                       </a:endParaRPr>
                     </a:p>
                   </a:txBody>
-                  <a:tcPr anchor="ctr">
+                  <a:tcPr marL="91441" marR="91441" anchor="ctr">
                     <a:lnL w="12700" cap="flat" cmpd="sng" algn="ctr">
                       <a:solidFill>
                         <a:schemeClr val="tx1">
@@ -3749,7 +3749,7 @@
                       </a:endParaRPr>
                     </a:p>
                   </a:txBody>
-                  <a:tcPr anchor="ctr">
+                  <a:tcPr marL="91441" marR="91441" anchor="ctr">
                     <a:lnR w="12700" cap="flat" cmpd="sng" algn="ctr">
                       <a:solidFill>
                         <a:schemeClr val="tx1">
@@ -3790,7 +3790,7 @@
                   </a:tcPr>
                 </a:tc>
               </a:tr>
-              <a:tr h="267291">
+              <a:tr h="277255">
                 <a:tc>
                   <a:txBody>
                     <a:bodyPr/>
@@ -3828,7 +3828,7 @@
                       </a:endParaRPr>
                     </a:p>
                   </a:txBody>
-                  <a:tcPr anchor="ctr">
+                  <a:tcPr marL="91441" marR="91441" anchor="ctr">
                     <a:lnL w="12700" cap="flat" cmpd="sng" algn="ctr">
                       <a:solidFill>
                         <a:schemeClr val="tx1">
@@ -3916,7 +3916,7 @@
                       </a:endParaRPr>
                     </a:p>
                   </a:txBody>
-                  <a:tcPr anchor="ctr">
+                  <a:tcPr marL="91441" marR="91441" anchor="ctr">
                     <a:lnR w="12700" cap="flat" cmpd="sng" algn="ctr">
                       <a:solidFill>
                         <a:schemeClr val="tx1">
@@ -3970,14 +3970,14 @@
           <p:nvPr>
             <p:extLst>
               <p:ext uri="{D42A27DB-BD31-4B8C-83A1-F6EECF244321}">
-                <p14:modId xmlns:p14="http://schemas.microsoft.com/office/powerpoint/2010/main" val="480264329"/>
+                <p14:modId xmlns:p14="http://schemas.microsoft.com/office/powerpoint/2010/main" val="2131985827"/>
               </p:ext>
             </p:extLst>
           </p:nvPr>
         </p:nvGraphicFramePr>
         <p:xfrm>
-          <a:off x="1151465" y="4027424"/>
-          <a:ext cx="3677013" cy="1181680"/>
+          <a:off x="1151467" y="4451170"/>
+          <a:ext cx="3677013" cy="1190486"/>
         </p:xfrm>
         <a:graphic>
           <a:graphicData uri="http://schemas.openxmlformats.org/drawingml/2006/table">
@@ -3989,7 +3989,7 @@
                 <a:gridCol w="1574185"/>
                 <a:gridCol w="2102828"/>
               </a:tblGrid>
-              <a:tr h="358720">
+              <a:tr h="358721">
                 <a:tc gridSpan="2">
                   <a:txBody>
                     <a:bodyPr/>
@@ -4003,7 +4003,7 @@
                       <a:endParaRPr lang="en-US" sz="1200" dirty="0"/>
                     </a:p>
                   </a:txBody>
-                  <a:tcPr anchor="ctr">
+                  <a:tcPr marL="91441" marR="91441" anchor="ctr">
                     <a:lnL w="12700" cap="flat" cmpd="sng" algn="ctr">
                       <a:solidFill>
                         <a:schemeClr val="tx1">
@@ -4041,7 +4041,7 @@
                   <a:tcPr/>
                 </a:tc>
               </a:tr>
-              <a:tr h="267291">
+              <a:tr h="277255">
                 <a:tc>
                   <a:txBody>
                     <a:bodyPr/>
@@ -4068,7 +4068,7 @@
                       </a:endParaRPr>
                     </a:p>
                   </a:txBody>
-                  <a:tcPr anchor="ctr">
+                  <a:tcPr marL="91441" marR="91441" anchor="ctr">
                     <a:lnL w="12700" cap="flat" cmpd="sng" algn="ctr">
                       <a:solidFill>
                         <a:schemeClr val="tx1">
@@ -4122,7 +4122,7 @@
                       </a:endParaRPr>
                     </a:p>
                   </a:txBody>
-                  <a:tcPr anchor="ctr">
+                  <a:tcPr marL="91441" marR="91441" anchor="ctr">
                     <a:lnR w="12700" cap="flat" cmpd="sng" algn="ctr">
                       <a:solidFill>
                         <a:schemeClr val="tx1">
@@ -4151,7 +4151,7 @@
                   </a:tcPr>
                 </a:tc>
               </a:tr>
-              <a:tr h="267291">
+              <a:tr h="277255">
                 <a:tc>
                   <a:txBody>
                     <a:bodyPr/>
@@ -4178,7 +4178,7 @@
                       </a:endParaRPr>
                     </a:p>
                   </a:txBody>
-                  <a:tcPr anchor="ctr">
+                  <a:tcPr marL="91441" marR="91441" anchor="ctr">
                     <a:lnL w="12700" cap="flat" cmpd="sng" algn="ctr">
                       <a:solidFill>
                         <a:schemeClr val="tx1">
@@ -4253,7 +4253,7 @@
                       </a:r>
                     </a:p>
                   </a:txBody>
-                  <a:tcPr anchor="ctr">
+                  <a:tcPr marL="91441" marR="91441" anchor="ctr">
                     <a:lnR w="12700" cap="flat" cmpd="sng" algn="ctr">
                       <a:solidFill>
                         <a:schemeClr val="tx1">
@@ -4294,7 +4294,7 @@
                   </a:tcPr>
                 </a:tc>
               </a:tr>
-              <a:tr h="267291">
+              <a:tr h="277255">
                 <a:tc>
                   <a:txBody>
                     <a:bodyPr/>
@@ -4321,7 +4321,7 @@
                       </a:endParaRPr>
                     </a:p>
                   </a:txBody>
-                  <a:tcPr anchor="ctr">
+                  <a:tcPr marL="91441" marR="91441" anchor="ctr">
                     <a:lnL w="12700" cap="flat" cmpd="sng" algn="ctr">
                       <a:solidFill>
                         <a:schemeClr val="tx1">
@@ -4387,7 +4387,7 @@
                       </a:endParaRPr>
                     </a:p>
                   </a:txBody>
-                  <a:tcPr anchor="ctr">
+                  <a:tcPr marL="91441" marR="91441" anchor="ctr">
                     <a:lnR w="12700" cap="flat" cmpd="sng" algn="ctr">
                       <a:solidFill>
                         <a:schemeClr val="tx1">
@@ -4441,14 +4441,14 @@
           <p:nvPr>
             <p:extLst>
               <p:ext uri="{D42A27DB-BD31-4B8C-83A1-F6EECF244321}">
-                <p14:modId xmlns:p14="http://schemas.microsoft.com/office/powerpoint/2010/main" val="288110266"/>
+                <p14:modId xmlns:p14="http://schemas.microsoft.com/office/powerpoint/2010/main" val="1521144194"/>
               </p:ext>
             </p:extLst>
           </p:nvPr>
         </p:nvGraphicFramePr>
         <p:xfrm>
-          <a:off x="7170766" y="778704"/>
-          <a:ext cx="3533423" cy="907360"/>
+          <a:off x="7583354" y="1202450"/>
+          <a:ext cx="3533423" cy="913231"/>
         </p:xfrm>
         <a:graphic>
           <a:graphicData uri="http://schemas.openxmlformats.org/drawingml/2006/table">
@@ -4460,7 +4460,7 @@
                 <a:gridCol w="1512712"/>
                 <a:gridCol w="2020711"/>
               </a:tblGrid>
-              <a:tr h="358720">
+              <a:tr h="358721">
                 <a:tc gridSpan="2">
                   <a:txBody>
                     <a:bodyPr/>
@@ -4474,7 +4474,7 @@
                       <a:endParaRPr lang="en-US" sz="1200" dirty="0"/>
                     </a:p>
                   </a:txBody>
-                  <a:tcPr anchor="ctr">
+                  <a:tcPr marL="91441" marR="91441" anchor="ctr">
                     <a:lnL w="12700" cap="flat" cmpd="sng" algn="ctr">
                       <a:solidFill>
                         <a:schemeClr val="tx1">
@@ -4512,7 +4512,7 @@
                   <a:tcPr/>
                 </a:tc>
               </a:tr>
-              <a:tr h="267291">
+              <a:tr h="277255">
                 <a:tc>
                   <a:txBody>
                     <a:bodyPr/>
@@ -4539,7 +4539,7 @@
                       </a:endParaRPr>
                     </a:p>
                   </a:txBody>
-                  <a:tcPr anchor="ctr">
+                  <a:tcPr marL="91441" marR="91441" anchor="ctr">
                     <a:lnL w="12700" cap="flat" cmpd="sng" algn="ctr">
                       <a:solidFill>
                         <a:schemeClr val="tx1">
@@ -4593,7 +4593,7 @@
                       </a:endParaRPr>
                     </a:p>
                   </a:txBody>
-                  <a:tcPr anchor="ctr">
+                  <a:tcPr marL="91441" marR="91441" anchor="ctr">
                     <a:lnR w="12700" cap="flat" cmpd="sng" algn="ctr">
                       <a:solidFill>
                         <a:schemeClr val="tx1">
@@ -4622,7 +4622,7 @@
                   </a:tcPr>
                 </a:tc>
               </a:tr>
-              <a:tr h="267291">
+              <a:tr h="277255">
                 <a:tc>
                   <a:txBody>
                     <a:bodyPr/>
@@ -4649,7 +4649,7 @@
                       </a:endParaRPr>
                     </a:p>
                   </a:txBody>
-                  <a:tcPr anchor="ctr">
+                  <a:tcPr marL="91441" marR="91441" anchor="ctr">
                     <a:lnL w="12700" cap="flat" cmpd="sng" algn="ctr">
                       <a:solidFill>
                         <a:schemeClr val="tx1">
@@ -4724,7 +4724,7 @@
                       </a:r>
                     </a:p>
                   </a:txBody>
-                  <a:tcPr anchor="ctr">
+                  <a:tcPr marL="91441" marR="91441" anchor="ctr">
                     <a:lnR w="12700" cap="flat" cmpd="sng" algn="ctr">
                       <a:solidFill>
                         <a:schemeClr val="tx1">
@@ -4778,14 +4778,14 @@
           <p:nvPr>
             <p:extLst>
               <p:ext uri="{D42A27DB-BD31-4B8C-83A1-F6EECF244321}">
-                <p14:modId xmlns:p14="http://schemas.microsoft.com/office/powerpoint/2010/main" val="1072034028"/>
+                <p14:modId xmlns:p14="http://schemas.microsoft.com/office/powerpoint/2010/main" val="77651023"/>
               </p:ext>
             </p:extLst>
           </p:nvPr>
         </p:nvGraphicFramePr>
         <p:xfrm>
-          <a:off x="7170765" y="2146784"/>
-          <a:ext cx="3533423" cy="2004640"/>
+          <a:off x="7583353" y="2570531"/>
+          <a:ext cx="3533423" cy="2022251"/>
         </p:xfrm>
         <a:graphic>
           <a:graphicData uri="http://schemas.openxmlformats.org/drawingml/2006/table">
@@ -4797,7 +4797,7 @@
                 <a:gridCol w="1512712"/>
                 <a:gridCol w="2020711"/>
               </a:tblGrid>
-              <a:tr h="358720">
+              <a:tr h="358721">
                 <a:tc gridSpan="2">
                   <a:txBody>
                     <a:bodyPr/>
@@ -4811,7 +4811,7 @@
                       <a:endParaRPr lang="en-US" sz="1200" dirty="0"/>
                     </a:p>
                   </a:txBody>
-                  <a:tcPr anchor="ctr">
+                  <a:tcPr marL="91441" marR="91441" anchor="ctr">
                     <a:lnL w="12700" cap="flat" cmpd="sng" algn="ctr">
                       <a:solidFill>
                         <a:schemeClr val="tx1">
@@ -4849,7 +4849,7 @@
                   <a:tcPr/>
                 </a:tc>
               </a:tr>
-              <a:tr h="267291">
+              <a:tr h="277255">
                 <a:tc>
                   <a:txBody>
                     <a:bodyPr/>
@@ -4876,7 +4876,7 @@
                       </a:endParaRPr>
                     </a:p>
                   </a:txBody>
-                  <a:tcPr anchor="ctr">
+                  <a:tcPr marL="91441" marR="91441" anchor="ctr">
                     <a:lnL w="12700" cap="flat" cmpd="sng" algn="ctr">
                       <a:solidFill>
                         <a:schemeClr val="tx1">
@@ -4930,7 +4930,7 @@
                       </a:endParaRPr>
                     </a:p>
                   </a:txBody>
-                  <a:tcPr anchor="ctr">
+                  <a:tcPr marL="91441" marR="91441" anchor="ctr">
                     <a:lnR w="12700" cap="flat" cmpd="sng" algn="ctr">
                       <a:solidFill>
                         <a:schemeClr val="tx1">
@@ -4959,7 +4959,7 @@
                   </a:tcPr>
                 </a:tc>
               </a:tr>
-              <a:tr h="267291">
+              <a:tr h="277255">
                 <a:tc>
                   <a:txBody>
                     <a:bodyPr/>
@@ -4986,7 +4986,7 @@
                       </a:endParaRPr>
                     </a:p>
                   </a:txBody>
-                  <a:tcPr anchor="ctr">
+                  <a:tcPr marL="91441" marR="91441" anchor="ctr">
                     <a:lnL w="12700" cap="flat" cmpd="sng" algn="ctr">
                       <a:solidFill>
                         <a:schemeClr val="tx1">
@@ -5061,7 +5061,7 @@
                       </a:r>
                     </a:p>
                   </a:txBody>
-                  <a:tcPr anchor="ctr">
+                  <a:tcPr marL="91441" marR="91441" anchor="ctr">
                     <a:lnR w="12700" cap="flat" cmpd="sng" algn="ctr">
                       <a:solidFill>
                         <a:schemeClr val="tx1">
@@ -5102,7 +5102,7 @@
                   </a:tcPr>
                 </a:tc>
               </a:tr>
-              <a:tr h="267291">
+              <a:tr h="277255">
                 <a:tc>
                   <a:txBody>
                     <a:bodyPr/>
@@ -5129,7 +5129,7 @@
                       </a:endParaRPr>
                     </a:p>
                   </a:txBody>
-                  <a:tcPr anchor="ctr">
+                  <a:tcPr marL="91441" marR="91441" anchor="ctr">
                     <a:lnL w="12700" cap="flat" cmpd="sng" algn="ctr">
                       <a:solidFill>
                         <a:schemeClr val="tx1">
@@ -5195,7 +5195,7 @@
                       </a:endParaRPr>
                     </a:p>
                   </a:txBody>
-                  <a:tcPr anchor="ctr">
+                  <a:tcPr marL="91441" marR="91441" anchor="ctr">
                     <a:lnR w="12700" cap="flat" cmpd="sng" algn="ctr">
                       <a:solidFill>
                         <a:schemeClr val="tx1">
@@ -5236,7 +5236,7 @@
                   </a:tcPr>
                 </a:tc>
               </a:tr>
-              <a:tr h="267291">
+              <a:tr h="277255">
                 <a:tc>
                   <a:txBody>
                     <a:bodyPr/>
@@ -5263,7 +5263,7 @@
                       </a:endParaRPr>
                     </a:p>
                   </a:txBody>
-                  <a:tcPr anchor="ctr">
+                  <a:tcPr marL="91441" marR="91441" anchor="ctr">
                     <a:lnL w="12700" cap="flat" cmpd="sng" algn="ctr">
                       <a:solidFill>
                         <a:schemeClr val="tx1">
@@ -5338,7 +5338,7 @@
                       </a:r>
                     </a:p>
                   </a:txBody>
-                  <a:tcPr anchor="ctr">
+                  <a:tcPr marL="91441" marR="91441" anchor="ctr">
                     <a:lnR w="12700" cap="flat" cmpd="sng" algn="ctr">
                       <a:solidFill>
                         <a:schemeClr val="tx1">
@@ -5379,7 +5379,7 @@
                   </a:tcPr>
                 </a:tc>
               </a:tr>
-              <a:tr h="267291">
+              <a:tr h="277255">
                 <a:tc>
                   <a:txBody>
                     <a:bodyPr/>
@@ -5406,7 +5406,7 @@
                       </a:endParaRPr>
                     </a:p>
                   </a:txBody>
-                  <a:tcPr anchor="ctr">
+                  <a:tcPr marL="91441" marR="91441" anchor="ctr">
                     <a:lnL w="12700" cap="flat" cmpd="sng" algn="ctr">
                       <a:solidFill>
                         <a:schemeClr val="tx1">
@@ -5481,7 +5481,7 @@
                       </a:r>
                     </a:p>
                   </a:txBody>
-                  <a:tcPr anchor="ctr">
+                  <a:tcPr marL="91441" marR="91441" anchor="ctr">
                     <a:lnR w="12700" cap="flat" cmpd="sng" algn="ctr">
                       <a:solidFill>
                         <a:schemeClr val="tx1">
@@ -5522,7 +5522,7 @@
                   </a:tcPr>
                 </a:tc>
               </a:tr>
-              <a:tr h="267291">
+              <a:tr h="277255">
                 <a:tc>
                   <a:txBody>
                     <a:bodyPr/>
@@ -5566,7 +5566,7 @@
                       </a:endParaRPr>
                     </a:p>
                   </a:txBody>
-                  <a:tcPr anchor="ctr">
+                  <a:tcPr marL="91441" marR="91441" anchor="ctr">
                     <a:lnL w="12700" cap="flat" cmpd="sng" algn="ctr">
                       <a:solidFill>
                         <a:schemeClr val="tx1">
@@ -5641,7 +5641,7 @@
                       </a:r>
                     </a:p>
                   </a:txBody>
-                  <a:tcPr anchor="ctr">
+                  <a:tcPr marL="91441" marR="91441" anchor="ctr">
                     <a:lnR w="12700" cap="flat" cmpd="sng" algn="ctr">
                       <a:solidFill>
                         <a:schemeClr val="tx1">
@@ -5697,8 +5697,8 @@
         </p:nvCxnSpPr>
         <p:spPr>
           <a:xfrm flipV="1">
-            <a:off x="4828478" y="1232384"/>
-            <a:ext cx="2342288" cy="731520"/>
+            <a:off x="4828478" y="1659065"/>
+            <a:ext cx="2754876" cy="740326"/>
           </a:xfrm>
           <a:prstGeom prst="line">
             <a:avLst/>
@@ -5731,8 +5731,8 @@
         </p:nvCxnSpPr>
         <p:spPr>
           <a:xfrm>
-            <a:off x="4828478" y="1963904"/>
-            <a:ext cx="2342287" cy="1185200"/>
+            <a:off x="4828478" y="2399391"/>
+            <a:ext cx="2754875" cy="1182265"/>
           </a:xfrm>
           <a:prstGeom prst="line">
             <a:avLst/>
@@ -5762,8 +5762,8 @@
         </p:nvSpPr>
         <p:spPr>
           <a:xfrm>
-            <a:off x="6668428" y="1112394"/>
-            <a:ext cx="502337" cy="369332"/>
+            <a:off x="7081017" y="1536141"/>
+            <a:ext cx="502338" cy="369332"/>
           </a:xfrm>
           <a:prstGeom prst="rect">
             <a:avLst/>
@@ -5777,7 +5777,7 @@
           <a:lstStyle/>
           <a:p>
             <a:r>
-              <a:rPr lang="en-US" smtClean="0">
+              <a:rPr lang="en-US">
                 <a:solidFill>
                   <a:schemeClr val="accent1"/>
                 </a:solidFill>
@@ -5800,8 +5800,8 @@
         </p:nvSpPr>
         <p:spPr>
           <a:xfrm>
-            <a:off x="6668428" y="2769464"/>
-            <a:ext cx="502337" cy="369332"/>
+            <a:off x="7081017" y="3193212"/>
+            <a:ext cx="502338" cy="369332"/>
           </a:xfrm>
           <a:prstGeom prst="rect">
             <a:avLst/>
@@ -5815,7 +5815,7 @@
           <a:lstStyle/>
           <a:p>
             <a:r>
-              <a:rPr lang="en-US" dirty="0" smtClean="0">
+              <a:rPr lang="en-US" dirty="0">
                 <a:solidFill>
                   <a:schemeClr val="accent1"/>
                 </a:solidFill>
@@ -5838,8 +5838,8 @@
         </p:nvSpPr>
         <p:spPr>
           <a:xfrm>
-            <a:off x="4950343" y="1686064"/>
-            <a:ext cx="502337" cy="369332"/>
+            <a:off x="4950343" y="2109811"/>
+            <a:ext cx="502338" cy="369332"/>
           </a:xfrm>
           <a:prstGeom prst="rect">
             <a:avLst/>
@@ -5853,7 +5853,7 @@
           <a:lstStyle/>
           <a:p>
             <a:r>
-              <a:rPr lang="en-US" smtClean="0">
+              <a:rPr lang="en-US">
                 <a:solidFill>
                   <a:schemeClr val="accent1"/>
                 </a:solidFill>
@@ -5876,8 +5876,8 @@
         </p:nvSpPr>
         <p:spPr>
           <a:xfrm>
-            <a:off x="4950343" y="1940558"/>
-            <a:ext cx="502337" cy="369332"/>
+            <a:off x="4950343" y="2364305"/>
+            <a:ext cx="502338" cy="369332"/>
           </a:xfrm>
           <a:prstGeom prst="rect">
             <a:avLst/>
@@ -5891,7 +5891,7 @@
           <a:lstStyle/>
           <a:p>
             <a:r>
-              <a:rPr lang="en-US" smtClean="0">
+              <a:rPr lang="en-US">
                 <a:solidFill>
                   <a:schemeClr val="accent1"/>
                 </a:solidFill>
@@ -5914,8 +5914,8 @@
         </p:nvSpPr>
         <p:spPr>
           <a:xfrm>
-            <a:off x="5463830" y="1085584"/>
-            <a:ext cx="919975" cy="919975"/>
+            <a:off x="5876418" y="1509331"/>
+            <a:ext cx="919976" cy="919976"/>
           </a:xfrm>
           <a:prstGeom prst="diamond">
             <a:avLst/>
@@ -5949,10 +5949,10 @@
           <a:p>
             <a:pPr algn="ctr"/>
             <a:r>
-              <a:rPr lang="en-US" sz="1400" b="1" smtClean="0"/>
+              <a:rPr lang="en-US" sz="1399" b="1"/>
               <a:t>has</a:t>
             </a:r>
-            <a:endParaRPr lang="en-US" sz="1400" b="1"/>
+            <a:endParaRPr lang="en-US" sz="1399" b="1"/>
           </a:p>
         </p:txBody>
       </p:sp>
@@ -5964,8 +5964,8 @@
         </p:nvSpPr>
         <p:spPr>
           <a:xfrm>
-            <a:off x="5463830" y="2083894"/>
-            <a:ext cx="919975" cy="919975"/>
+            <a:off x="5876418" y="2507640"/>
+            <a:ext cx="919976" cy="919976"/>
           </a:xfrm>
           <a:prstGeom prst="diamond">
             <a:avLst/>
@@ -5999,10 +5999,10 @@
           <a:p>
             <a:pPr algn="ctr"/>
             <a:r>
-              <a:rPr lang="en-US" sz="1400" b="1" smtClean="0"/>
+              <a:rPr lang="en-US" sz="1399" b="1"/>
               <a:t>has</a:t>
             </a:r>
-            <a:endParaRPr lang="en-US" sz="1400" b="1"/>
+            <a:endParaRPr lang="en-US" sz="1399" b="1"/>
           </a:p>
         </p:txBody>
       </p:sp>

</xml_diff>